<commit_message>
Alguns pontos a serem mudados no ppt corrigidos
</commit_message>
<xml_diff>
--- a/4-Semestre/Documentação/Material-institucional/Simplify.pptx
+++ b/4-Semestre/Documentação/Material-institucional/Simplify.pptx
@@ -118,6 +118,11 @@
       </a:defRPr>
     </a:lvl9pPr>
   </p:defaultTextStyle>
+  <p:extLst>
+    <p:ext uri="{EFAFB233-063F-42B5-8137-9DF3F51BA10A}">
+      <p15:sldGuideLst xmlns:p15="http://schemas.microsoft.com/office/powerpoint/2012/main"/>
+    </p:ext>
+  </p:extLst>
 </p:presentation>
 </file>
 
@@ -268,7 +273,7 @@
           <a:p>
             <a:fld id="{39D4236D-FCDC-4FB8-BDD2-642A29B4F6CC}" type="datetimeFigureOut">
               <a:rPr lang="pt-BR" smtClean="0"/>
-              <a:t>08/03/2021</a:t>
+              <a:t>09/03/2021</a:t>
             </a:fld>
             <a:endParaRPr lang="pt-BR"/>
           </a:p>
@@ -466,7 +471,7 @@
           <a:p>
             <a:fld id="{39D4236D-FCDC-4FB8-BDD2-642A29B4F6CC}" type="datetimeFigureOut">
               <a:rPr lang="pt-BR" smtClean="0"/>
-              <a:t>08/03/2021</a:t>
+              <a:t>09/03/2021</a:t>
             </a:fld>
             <a:endParaRPr lang="pt-BR"/>
           </a:p>
@@ -674,7 +679,7 @@
           <a:p>
             <a:fld id="{39D4236D-FCDC-4FB8-BDD2-642A29B4F6CC}" type="datetimeFigureOut">
               <a:rPr lang="pt-BR" smtClean="0"/>
-              <a:t>08/03/2021</a:t>
+              <a:t>09/03/2021</a:t>
             </a:fld>
             <a:endParaRPr lang="pt-BR"/>
           </a:p>
@@ -872,7 +877,7 @@
           <a:p>
             <a:fld id="{39D4236D-FCDC-4FB8-BDD2-642A29B4F6CC}" type="datetimeFigureOut">
               <a:rPr lang="pt-BR" smtClean="0"/>
-              <a:t>08/03/2021</a:t>
+              <a:t>09/03/2021</a:t>
             </a:fld>
             <a:endParaRPr lang="pt-BR"/>
           </a:p>
@@ -1147,7 +1152,7 @@
           <a:p>
             <a:fld id="{39D4236D-FCDC-4FB8-BDD2-642A29B4F6CC}" type="datetimeFigureOut">
               <a:rPr lang="pt-BR" smtClean="0"/>
-              <a:t>08/03/2021</a:t>
+              <a:t>09/03/2021</a:t>
             </a:fld>
             <a:endParaRPr lang="pt-BR"/>
           </a:p>
@@ -1412,7 +1417,7 @@
           <a:p>
             <a:fld id="{39D4236D-FCDC-4FB8-BDD2-642A29B4F6CC}" type="datetimeFigureOut">
               <a:rPr lang="pt-BR" smtClean="0"/>
-              <a:t>08/03/2021</a:t>
+              <a:t>09/03/2021</a:t>
             </a:fld>
             <a:endParaRPr lang="pt-BR"/>
           </a:p>
@@ -1824,7 +1829,7 @@
           <a:p>
             <a:fld id="{39D4236D-FCDC-4FB8-BDD2-642A29B4F6CC}" type="datetimeFigureOut">
               <a:rPr lang="pt-BR" smtClean="0"/>
-              <a:t>08/03/2021</a:t>
+              <a:t>09/03/2021</a:t>
             </a:fld>
             <a:endParaRPr lang="pt-BR"/>
           </a:p>
@@ -1965,7 +1970,7 @@
           <a:p>
             <a:fld id="{39D4236D-FCDC-4FB8-BDD2-642A29B4F6CC}" type="datetimeFigureOut">
               <a:rPr lang="pt-BR" smtClean="0"/>
-              <a:t>08/03/2021</a:t>
+              <a:t>09/03/2021</a:t>
             </a:fld>
             <a:endParaRPr lang="pt-BR"/>
           </a:p>
@@ -2078,7 +2083,7 @@
           <a:p>
             <a:fld id="{39D4236D-FCDC-4FB8-BDD2-642A29B4F6CC}" type="datetimeFigureOut">
               <a:rPr lang="pt-BR" smtClean="0"/>
-              <a:t>08/03/2021</a:t>
+              <a:t>09/03/2021</a:t>
             </a:fld>
             <a:endParaRPr lang="pt-BR"/>
           </a:p>
@@ -2389,7 +2394,7 @@
           <a:p>
             <a:fld id="{39D4236D-FCDC-4FB8-BDD2-642A29B4F6CC}" type="datetimeFigureOut">
               <a:rPr lang="pt-BR" smtClean="0"/>
-              <a:t>08/03/2021</a:t>
+              <a:t>09/03/2021</a:t>
             </a:fld>
             <a:endParaRPr lang="pt-BR"/>
           </a:p>
@@ -2677,7 +2682,7 @@
           <a:p>
             <a:fld id="{39D4236D-FCDC-4FB8-BDD2-642A29B4F6CC}" type="datetimeFigureOut">
               <a:rPr lang="pt-BR" smtClean="0"/>
-              <a:t>08/03/2021</a:t>
+              <a:t>09/03/2021</a:t>
             </a:fld>
             <a:endParaRPr lang="pt-BR"/>
           </a:p>
@@ -2918,7 +2923,7 @@
           <a:p>
             <a:fld id="{39D4236D-FCDC-4FB8-BDD2-642A29B4F6CC}" type="datetimeFigureOut">
               <a:rPr lang="pt-BR" smtClean="0"/>
-              <a:t>08/03/2021</a:t>
+              <a:t>09/03/2021</a:t>
             </a:fld>
             <a:endParaRPr lang="pt-BR"/>
           </a:p>
@@ -4259,9 +4264,18 @@
   <p:clrMapOvr>
     <a:masterClrMapping/>
   </p:clrMapOvr>
-  <p:transition spd="slow">
-    <p:push/>
-  </p:transition>
+  <mc:AlternateContent xmlns:mc="http://schemas.openxmlformats.org/markup-compatibility/2006">
+    <mc:Choice xmlns:p15="http://schemas.microsoft.com/office/powerpoint/2012/main" Requires="p15">
+      <p:transition xmlns:p14="http://schemas.microsoft.com/office/powerpoint/2010/main" spd="slow" p14:dur="3250">
+        <p15:prstTrans prst="origami"/>
+      </p:transition>
+    </mc:Choice>
+    <mc:Fallback>
+      <p:transition spd="slow">
+        <p:fade/>
+      </p:transition>
+    </mc:Fallback>
+  </mc:AlternateContent>
 </p:sld>
 </file>
 

</xml_diff>